<commit_message>
Minor fix to Ui Class Diagram
</commit_message>
<xml_diff>
--- a/docs/diagrams/UiComponentClassDiagram.pptx
+++ b/docs/diagrams/UiComponentClassDiagram.pptx
@@ -4863,8 +4863,8 @@
         </p:nvSpPr>
         <p:spPr>
           <a:xfrm rot="16200000">
-            <a:off x="6213739" y="4560376"/>
-            <a:ext cx="1371599" cy="328045"/>
+            <a:off x="6055893" y="4718220"/>
+            <a:ext cx="1687291" cy="328045"/>
           </a:xfrm>
           <a:prstGeom prst="roundRect">
             <a:avLst/>
@@ -5557,17 +5557,7 @@
                   </a:schemeClr>
                 </a:solidFill>
               </a:rPr>
-              <a:t>Task</a:t>
-            </a:r>
-            <a:r>
-              <a:rPr lang="en-US" sz="1050" b="1" dirty="0" err="1" smtClean="0">
-                <a:solidFill>
-                  <a:schemeClr val="accent3">
-                    <a:lumMod val="75000"/>
-                  </a:schemeClr>
-                </a:solidFill>
-              </a:rPr>
-              <a:t>ListPanel</a:t>
+              <a:t>TaskListPanel</a:t>
             </a:r>
             <a:endParaRPr lang="en-SG" sz="1050" b="1" dirty="0">
               <a:solidFill>
@@ -5703,17 +5693,7 @@
                   </a:schemeClr>
                 </a:solidFill>
               </a:rPr>
-              <a:t>Task</a:t>
-            </a:r>
-            <a:r>
-              <a:rPr lang="en-US" sz="1050" b="1" dirty="0" err="1" smtClean="0">
-                <a:solidFill>
-                  <a:schemeClr val="accent3">
-                    <a:lumMod val="75000"/>
-                  </a:schemeClr>
-                </a:solidFill>
-              </a:rPr>
-              <a:t>Card</a:t>
+              <a:t>TaskCard</a:t>
             </a:r>
             <a:endParaRPr lang="en-SG" sz="1050" b="1" dirty="0">
               <a:solidFill>

</xml_diff>